<commit_message>
Lagt till Patrik Brandt
</commit_message>
<xml_diff>
--- a/Föreläsningar/Kursintroduktion.pptx
+++ b/Föreläsningar/Kursintroduktion.pptx
@@ -197,7 +197,7 @@
             <a:fld id="{D591C14E-198E-48A7-ABEC-7FB80E868E55}" type="datetimeFigureOut">
               <a:rPr lang="sv-SE" smtClean="0"/>
               <a:pPr/>
-              <a:t>2013-08-30</a:t>
+              <a:t>2013-09-03</a:t>
             </a:fld>
             <a:endParaRPr lang="sv-SE"/>
           </a:p>
@@ -364,7 +364,7 @@
             <a:fld id="{188BB863-C913-48B5-BD1A-638D82A0C76B}" type="datetimeFigureOut">
               <a:rPr lang="sv-SE" smtClean="0"/>
               <a:pPr/>
-              <a:t>2013-08-30</a:t>
+              <a:t>2013-09-03</a:t>
             </a:fld>
             <a:endParaRPr lang="sv-SE"/>
           </a:p>
@@ -7577,8 +7577,8 @@
         </p:nvSpPr>
         <p:spPr>
           <a:xfrm>
-            <a:off x="2411760" y="2425452"/>
-            <a:ext cx="4035930" cy="1384995"/>
+            <a:off x="2483768" y="1777380"/>
+            <a:ext cx="4243605" cy="3108544"/>
           </a:xfrm>
           <a:prstGeom prst="rect">
             <a:avLst/>
@@ -7619,7 +7619,36 @@
               </a:rPr>
               <a:t>miljön</a:t>
             </a:r>
+          </a:p>
+          <a:p>
             <a:endParaRPr lang="sv-SE" sz="2800" dirty="0" smtClean="0">
+              <a:latin typeface="Minya Nouvelle" charset="0"/>
+            </a:endParaRPr>
+          </a:p>
+          <a:p>
+            <a:endParaRPr lang="sv-SE" sz="2800" dirty="0">
+              <a:latin typeface="Minya Nouvelle" charset="0"/>
+            </a:endParaRPr>
+          </a:p>
+          <a:p>
+            <a:r>
+              <a:rPr lang="sv-SE" sz="2800" dirty="0" smtClean="0">
+                <a:latin typeface="Minya Nouvelle" charset="0"/>
+              </a:rPr>
+              <a:t>11.15 Patrik Brandt</a:t>
+            </a:r>
+            <a:br>
+              <a:rPr lang="sv-SE" sz="2800" dirty="0" smtClean="0">
+                <a:latin typeface="Minya Nouvelle" charset="0"/>
+              </a:rPr>
+            </a:br>
+            <a:r>
+              <a:rPr lang="sv-SE" sz="2800" i="1" dirty="0" smtClean="0">
+                <a:latin typeface="Minya Nouvelle" charset="0"/>
+              </a:rPr>
+              <a:t>Att studera på universitet</a:t>
+            </a:r>
+            <a:endParaRPr lang="sv-SE" sz="2800" i="1" dirty="0" smtClean="0">
               <a:latin typeface="Minya Nouvelle" charset="0"/>
             </a:endParaRPr>
           </a:p>
@@ -7642,7 +7671,7 @@
         </p:blipFill>
         <p:spPr bwMode="auto">
           <a:xfrm>
-            <a:off x="1705179" y="2376960"/>
+            <a:off x="1719391" y="1728888"/>
             <a:ext cx="609600" cy="609600"/>
           </a:xfrm>
           <a:prstGeom prst="rect">
@@ -7668,13 +7697,37 @@
         </p:blipFill>
         <p:spPr bwMode="auto">
           <a:xfrm>
-            <a:off x="1677468" y="3242871"/>
+            <a:off x="1691680" y="2594799"/>
             <a:ext cx="617537" cy="617537"/>
           </a:xfrm>
           <a:prstGeom prst="rect">
             <a:avLst/>
           </a:prstGeom>
           <a:noFill/>
+        </p:spPr>
+      </p:pic>
+      <p:pic>
+        <p:nvPicPr>
+          <p:cNvPr id="3" name="Picture 2"/>
+          <p:cNvPicPr>
+            <a:picLocks noChangeAspect="1"/>
+          </p:cNvPicPr>
+          <p:nvPr/>
+        </p:nvPicPr>
+        <p:blipFill>
+          <a:blip r:embed="rId4"/>
+          <a:stretch>
+            <a:fillRect/>
+          </a:stretch>
+        </p:blipFill>
+        <p:spPr>
+          <a:xfrm>
+            <a:off x="1331640" y="3707194"/>
+            <a:ext cx="936104" cy="1310546"/>
+          </a:xfrm>
+          <a:prstGeom prst="rect">
+            <a:avLst/>
+          </a:prstGeom>
         </p:spPr>
       </p:pic>
     </p:spTree>

</xml_diff>